<commit_message>
실행시 NOT FOUND CLASS 대처
</commit_message>
<xml_diff>
--- a/src/main/resources/egovframework/권한관리.pptx
+++ b/src/main/resources/egovframework/권한관리.pptx
@@ -6,6 +6,7 @@
   </p:sldMasterIdLst>
   <p:sldIdLst>
     <p:sldId id="256" r:id="rId2"/>
+    <p:sldId id="257" r:id="rId3"/>
   </p:sldIdLst>
   <p:sldSz cx="12192000" cy="6858000"/>
   <p:notesSz cx="6858000" cy="9144000"/>
@@ -104,6 +105,11 @@
       </a:defRPr>
     </a:lvl9pPr>
   </p:defaultTextStyle>
+  <p:extLst>
+    <p:ext uri="{EFAFB233-063F-42B5-8137-9DF3F51BA10A}">
+      <p15:sldGuideLst xmlns:p15="http://schemas.microsoft.com/office/powerpoint/2012/main"/>
+    </p:ext>
+  </p:extLst>
 </p:presentation>
 </file>
 
@@ -254,7 +260,7 @@
           <a:p>
             <a:fld id="{93380DD0-0CF3-487E-B162-71FEDD60630B}" type="datetimeFigureOut">
               <a:rPr lang="ko-KR" altLang="en-US" smtClean="0"/>
-              <a:t>2022-08-12</a:t>
+              <a:t>2022-08-20</a:t>
             </a:fld>
             <a:endParaRPr lang="ko-KR" altLang="en-US"/>
           </a:p>
@@ -452,7 +458,7 @@
           <a:p>
             <a:fld id="{93380DD0-0CF3-487E-B162-71FEDD60630B}" type="datetimeFigureOut">
               <a:rPr lang="ko-KR" altLang="en-US" smtClean="0"/>
-              <a:t>2022-08-12</a:t>
+              <a:t>2022-08-20</a:t>
             </a:fld>
             <a:endParaRPr lang="ko-KR" altLang="en-US"/>
           </a:p>
@@ -660,7 +666,7 @@
           <a:p>
             <a:fld id="{93380DD0-0CF3-487E-B162-71FEDD60630B}" type="datetimeFigureOut">
               <a:rPr lang="ko-KR" altLang="en-US" smtClean="0"/>
-              <a:t>2022-08-12</a:t>
+              <a:t>2022-08-20</a:t>
             </a:fld>
             <a:endParaRPr lang="ko-KR" altLang="en-US"/>
           </a:p>
@@ -858,7 +864,7 @@
           <a:p>
             <a:fld id="{93380DD0-0CF3-487E-B162-71FEDD60630B}" type="datetimeFigureOut">
               <a:rPr lang="ko-KR" altLang="en-US" smtClean="0"/>
-              <a:t>2022-08-12</a:t>
+              <a:t>2022-08-20</a:t>
             </a:fld>
             <a:endParaRPr lang="ko-KR" altLang="en-US"/>
           </a:p>
@@ -1133,7 +1139,7 @@
           <a:p>
             <a:fld id="{93380DD0-0CF3-487E-B162-71FEDD60630B}" type="datetimeFigureOut">
               <a:rPr lang="ko-KR" altLang="en-US" smtClean="0"/>
-              <a:t>2022-08-12</a:t>
+              <a:t>2022-08-20</a:t>
             </a:fld>
             <a:endParaRPr lang="ko-KR" altLang="en-US"/>
           </a:p>
@@ -1398,7 +1404,7 @@
           <a:p>
             <a:fld id="{93380DD0-0CF3-487E-B162-71FEDD60630B}" type="datetimeFigureOut">
               <a:rPr lang="ko-KR" altLang="en-US" smtClean="0"/>
-              <a:t>2022-08-12</a:t>
+              <a:t>2022-08-20</a:t>
             </a:fld>
             <a:endParaRPr lang="ko-KR" altLang="en-US"/>
           </a:p>
@@ -1810,7 +1816,7 @@
           <a:p>
             <a:fld id="{93380DD0-0CF3-487E-B162-71FEDD60630B}" type="datetimeFigureOut">
               <a:rPr lang="ko-KR" altLang="en-US" smtClean="0"/>
-              <a:t>2022-08-12</a:t>
+              <a:t>2022-08-20</a:t>
             </a:fld>
             <a:endParaRPr lang="ko-KR" altLang="en-US"/>
           </a:p>
@@ -1951,7 +1957,7 @@
           <a:p>
             <a:fld id="{93380DD0-0CF3-487E-B162-71FEDD60630B}" type="datetimeFigureOut">
               <a:rPr lang="ko-KR" altLang="en-US" smtClean="0"/>
-              <a:t>2022-08-12</a:t>
+              <a:t>2022-08-20</a:t>
             </a:fld>
             <a:endParaRPr lang="ko-KR" altLang="en-US"/>
           </a:p>
@@ -2064,7 +2070,7 @@
           <a:p>
             <a:fld id="{93380DD0-0CF3-487E-B162-71FEDD60630B}" type="datetimeFigureOut">
               <a:rPr lang="ko-KR" altLang="en-US" smtClean="0"/>
-              <a:t>2022-08-12</a:t>
+              <a:t>2022-08-20</a:t>
             </a:fld>
             <a:endParaRPr lang="ko-KR" altLang="en-US"/>
           </a:p>
@@ -2375,7 +2381,7 @@
           <a:p>
             <a:fld id="{93380DD0-0CF3-487E-B162-71FEDD60630B}" type="datetimeFigureOut">
               <a:rPr lang="ko-KR" altLang="en-US" smtClean="0"/>
-              <a:t>2022-08-12</a:t>
+              <a:t>2022-08-20</a:t>
             </a:fld>
             <a:endParaRPr lang="ko-KR" altLang="en-US"/>
           </a:p>
@@ -2663,7 +2669,7 @@
           <a:p>
             <a:fld id="{93380DD0-0CF3-487E-B162-71FEDD60630B}" type="datetimeFigureOut">
               <a:rPr lang="ko-KR" altLang="en-US" smtClean="0"/>
-              <a:t>2022-08-12</a:t>
+              <a:t>2022-08-20</a:t>
             </a:fld>
             <a:endParaRPr lang="ko-KR" altLang="en-US"/>
           </a:p>
@@ -2904,7 +2910,7 @@
           <a:p>
             <a:fld id="{93380DD0-0CF3-487E-B162-71FEDD60630B}" type="datetimeFigureOut">
               <a:rPr lang="ko-KR" altLang="en-US" smtClean="0"/>
-              <a:t>2022-08-12</a:t>
+              <a:t>2022-08-20</a:t>
             </a:fld>
             <a:endParaRPr lang="ko-KR" altLang="en-US"/>
           </a:p>
@@ -5569,6 +5575,109 @@
 </p:sld>
 </file>
 
+<file path=ppt/slides/slide2.xml><?xml version="1.0" encoding="utf-8"?>
+<p:sld xmlns:a="http://schemas.openxmlformats.org/drawingml/2006/main" xmlns:r="http://schemas.openxmlformats.org/officeDocument/2006/relationships" xmlns:p="http://schemas.openxmlformats.org/presentationml/2006/main">
+  <p:cSld>
+    <p:spTree>
+      <p:nvGrpSpPr>
+        <p:cNvPr id="1" name=""/>
+        <p:cNvGrpSpPr/>
+        <p:nvPr/>
+      </p:nvGrpSpPr>
+      <p:grpSpPr>
+        <a:xfrm>
+          <a:off x="0" y="0"/>
+          <a:ext cx="0" cy="0"/>
+          <a:chOff x="0" y="0"/>
+          <a:chExt cx="0" cy="0"/>
+        </a:xfrm>
+      </p:grpSpPr>
+      <p:pic>
+        <p:nvPicPr>
+          <p:cNvPr id="7" name="그림 6">
+            <a:extLst>
+              <a:ext uri="{FF2B5EF4-FFF2-40B4-BE49-F238E27FC236}">
+                <a16:creationId xmlns:a16="http://schemas.microsoft.com/office/drawing/2014/main" id="{FD510C18-72B2-4561-901C-11AF022364AD}"/>
+              </a:ext>
+            </a:extLst>
+          </p:cNvPr>
+          <p:cNvPicPr>
+            <a:picLocks noChangeAspect="1"/>
+          </p:cNvPicPr>
+          <p:nvPr/>
+        </p:nvPicPr>
+        <p:blipFill>
+          <a:blip r:embed="rId2"/>
+          <a:stretch>
+            <a:fillRect/>
+          </a:stretch>
+        </p:blipFill>
+        <p:spPr>
+          <a:xfrm>
+            <a:off x="273428" y="724249"/>
+            <a:ext cx="8591550" cy="2590800"/>
+          </a:xfrm>
+          <a:prstGeom prst="rect">
+            <a:avLst/>
+          </a:prstGeom>
+        </p:spPr>
+      </p:pic>
+      <p:sp>
+        <p:nvSpPr>
+          <p:cNvPr id="8" name="TextBox 7">
+            <a:extLst>
+              <a:ext uri="{FF2B5EF4-FFF2-40B4-BE49-F238E27FC236}">
+                <a16:creationId xmlns:a16="http://schemas.microsoft.com/office/drawing/2014/main" id="{7A363658-8250-4852-9E17-D39D1829630E}"/>
+              </a:ext>
+            </a:extLst>
+          </p:cNvPr>
+          <p:cNvSpPr txBox="1"/>
+          <p:nvPr/>
+        </p:nvSpPr>
+        <p:spPr>
+          <a:xfrm>
+            <a:off x="411061" y="352338"/>
+            <a:ext cx="3304110" cy="369332"/>
+          </a:xfrm>
+          <a:prstGeom prst="rect">
+            <a:avLst/>
+          </a:prstGeom>
+          <a:noFill/>
+        </p:spPr>
+        <p:txBody>
+          <a:bodyPr wrap="none" rtlCol="0">
+            <a:spAutoFit/>
+          </a:bodyPr>
+          <a:lstStyle/>
+          <a:p>
+            <a:r>
+              <a:rPr lang="ko-KR" altLang="en-US"/>
+              <a:t>실행시 </a:t>
+            </a:r>
+            <a:r>
+              <a:rPr lang="en-US" altLang="ko-KR"/>
+              <a:t>class </a:t>
+            </a:r>
+            <a:r>
+              <a:rPr lang="ko-KR" altLang="en-US"/>
+              <a:t>파일 없다고 할시</a:t>
+            </a:r>
+          </a:p>
+        </p:txBody>
+      </p:sp>
+    </p:spTree>
+    <p:extLst>
+      <p:ext uri="{BB962C8B-B14F-4D97-AF65-F5344CB8AC3E}">
+        <p14:creationId xmlns:p14="http://schemas.microsoft.com/office/powerpoint/2010/main" val="3657175441"/>
+      </p:ext>
+    </p:extLst>
+  </p:cSld>
+  <p:clrMapOvr>
+    <a:masterClrMapping/>
+  </p:clrMapOvr>
+</p:sld>
+</file>
+
 <file path=ppt/theme/theme1.xml><?xml version="1.0" encoding="utf-8"?>
 <a:theme xmlns:a="http://schemas.openxmlformats.org/drawingml/2006/main" name="Office 테마">
   <a:themeElements>

</xml_diff>